<commit_message>
Revert "Merge currently  outstanding changes into master for important analysis "
</commit_message>
<xml_diff>
--- a/Web-OS-branches.pptx
+++ b/Web-OS-branches.pptx
@@ -3100,76 +3100,6 @@
           <a:chExt cx="0" cy="0"/>
         </a:xfrm>
       </p:grpSpPr>
-      <p:cxnSp>
-        <p:nvCxnSpPr>
-          <p:cNvPr id="99" name="Straight Arrow Connector 98"/>
-          <p:cNvCxnSpPr>
-            <a:endCxn id="55" idx="4"/>
-          </p:cNvCxnSpPr>
-          <p:nvPr/>
-        </p:nvCxnSpPr>
-        <p:spPr>
-          <a:xfrm flipH="1" flipV="1">
-            <a:off x="4580052" y="2555994"/>
-            <a:ext cx="34918" cy="1096115"/>
-          </a:xfrm>
-          <a:prstGeom prst="straightConnector1">
-            <a:avLst/>
-          </a:prstGeom>
-          <a:ln>
-            <a:tailEnd type="arrow"/>
-          </a:ln>
-        </p:spPr>
-        <p:style>
-          <a:lnRef idx="2">
-            <a:schemeClr val="accent3"/>
-          </a:lnRef>
-          <a:fillRef idx="0">
-            <a:schemeClr val="accent3"/>
-          </a:fillRef>
-          <a:effectRef idx="1">
-            <a:schemeClr val="accent3"/>
-          </a:effectRef>
-          <a:fontRef idx="minor">
-            <a:schemeClr val="tx1"/>
-          </a:fontRef>
-        </p:style>
-      </p:cxnSp>
-      <p:cxnSp>
-        <p:nvCxnSpPr>
-          <p:cNvPr id="100" name="Straight Arrow Connector 99"/>
-          <p:cNvCxnSpPr>
-            <a:endCxn id="74" idx="4"/>
-          </p:cNvCxnSpPr>
-          <p:nvPr/>
-        </p:nvCxnSpPr>
-        <p:spPr>
-          <a:xfrm flipH="1" flipV="1">
-            <a:off x="4491774" y="913284"/>
-            <a:ext cx="51934" cy="1074922"/>
-          </a:xfrm>
-          <a:prstGeom prst="straightConnector1">
-            <a:avLst/>
-          </a:prstGeom>
-          <a:ln>
-            <a:tailEnd type="arrow"/>
-          </a:ln>
-        </p:spPr>
-        <p:style>
-          <a:lnRef idx="2">
-            <a:schemeClr val="accent3"/>
-          </a:lnRef>
-          <a:fillRef idx="0">
-            <a:schemeClr val="accent3"/>
-          </a:fillRef>
-          <a:effectRef idx="1">
-            <a:schemeClr val="accent3"/>
-          </a:effectRef>
-          <a:fontRef idx="minor">
-            <a:schemeClr val="tx1"/>
-          </a:fontRef>
-        </p:style>
-      </p:cxnSp>
       <p:cxnSp>
         <p:nvCxnSpPr>
           <p:cNvPr id="122" name="Straight Arrow Connector 121"/>

</xml_diff>